<commit_message>
add refs/PLDI2019 Model Checking for Weakly Consistent Libraries
</commit_message>
<xml_diff>
--- a/alloy/report/ASPLOS2017.pptx
+++ b/alloy/report/ASPLOS2017.pptx
@@ -233,7 +233,7 @@
           <a:p>
             <a:fld id="{6793EC8D-7583-4284-A537-DAB3CE5650E5}" type="datetimeFigureOut">
               <a:rPr lang="zh-CN" altLang="en-US" smtClean="0"/>
-              <a:t>2022/5/23</a:t>
+              <a:t>2023/3/1</a:t>
             </a:fld>
             <a:endParaRPr lang="zh-CN" altLang="en-US"/>
           </a:p>
@@ -398,7 +398,7 @@
           <a:p>
             <a:fld id="{B646ED33-92F3-419A-83F1-939B2101925B}" type="datetimeFigureOut">
               <a:rPr lang="zh-CN" altLang="en-US" smtClean="0"/>
-              <a:t>2022/5/23</a:t>
+              <a:t>2023/3/1</a:t>
             </a:fld>
             <a:endParaRPr lang="zh-CN" altLang="en-US"/>
           </a:p>
@@ -1351,7 +1351,7 @@
                 </a:solidFill>
                 <a:ea typeface="宋体"/>
               </a:rPr>
-              <a:t>May 23, 2022</a:t>
+              <a:t>March 1, 2023</a:t>
             </a:fld>
             <a:endParaRPr kumimoji="1" lang="zh-CN" altLang="en-US">
               <a:solidFill>
@@ -1559,7 +1559,7 @@
           <a:p>
             <a:fld id="{5F4FBBCF-6140-4F34-B704-0B80CB6EFB2C}" type="datetime4">
               <a:rPr lang="en-US" altLang="zh-CN" smtClean="0"/>
-              <a:t>May 23, 2022</a:t>
+              <a:t>March 1, 2023</a:t>
             </a:fld>
             <a:endParaRPr lang="zh-CN" altLang="en-US"/>
           </a:p>
@@ -1750,7 +1750,7 @@
           <a:p>
             <a:fld id="{5361CD0A-BE88-46E0-824D-35AE91BA901F}" type="datetime4">
               <a:rPr lang="en-US" altLang="zh-CN" smtClean="0"/>
-              <a:t>May 23, 2022</a:t>
+              <a:t>March 1, 2023</a:t>
             </a:fld>
             <a:endParaRPr lang="zh-CN" altLang="en-US"/>
           </a:p>
@@ -2023,7 +2023,7 @@
                   </a:prstClr>
                 </a:solidFill>
               </a:rPr>
-              <a:t>May 23, 2022</a:t>
+              <a:t>March 1, 2023</a:t>
             </a:fld>
             <a:endParaRPr lang="zh-CN" altLang="en-US">
               <a:solidFill>
@@ -2488,7 +2488,7 @@
                   </a:prstClr>
                 </a:solidFill>
               </a:rPr>
-              <a:t>May 23, 2022</a:t>
+              <a:t>March 1, 2023</a:t>
             </a:fld>
             <a:endParaRPr lang="zh-CN" altLang="en-US">
               <a:solidFill>
@@ -2873,7 +2873,7 @@
                   </a:prstClr>
                 </a:solidFill>
               </a:rPr>
-              <a:t>May 23, 2022</a:t>
+              <a:t>March 1, 2023</a:t>
             </a:fld>
             <a:endParaRPr lang="zh-CN" altLang="en-US">
               <a:solidFill>
@@ -3301,7 +3301,7 @@
                   </a:prstClr>
                 </a:solidFill>
               </a:rPr>
-              <a:t>May 23, 2022</a:t>
+              <a:t>March 1, 2023</a:t>
             </a:fld>
             <a:endParaRPr lang="zh-CN" altLang="en-US">
               <a:solidFill>
@@ -3659,7 +3659,7 @@
                   </a:prstClr>
                 </a:solidFill>
               </a:rPr>
-              <a:t>May 23, 2022</a:t>
+              <a:t>March 1, 2023</a:t>
             </a:fld>
             <a:endParaRPr lang="zh-CN" altLang="en-US">
               <a:solidFill>
@@ -3946,7 +3946,7 @@
                   </a:prstClr>
                 </a:solidFill>
               </a:rPr>
-              <a:t>May 23, 2022</a:t>
+              <a:t>March 1, 2023</a:t>
             </a:fld>
             <a:endParaRPr lang="zh-CN" altLang="en-US">
               <a:solidFill>
@@ -4096,7 +4096,7 @@
                   </a:prstClr>
                 </a:solidFill>
               </a:rPr>
-              <a:t>May 23, 2022</a:t>
+              <a:t>March 1, 2023</a:t>
             </a:fld>
             <a:endParaRPr lang="zh-CN" altLang="en-US">
               <a:solidFill>
@@ -4434,7 +4434,7 @@
                   </a:prstClr>
                 </a:solidFill>
               </a:rPr>
-              <a:t>May 23, 2022</a:t>
+              <a:t>March 1, 2023</a:t>
             </a:fld>
             <a:endParaRPr lang="zh-CN" altLang="en-US">
               <a:solidFill>
@@ -4697,7 +4697,7 @@
                 </a:solidFill>
                 <a:ea typeface="宋体"/>
               </a:rPr>
-              <a:t>May 23, 2022</a:t>
+              <a:t>March 1, 2023</a:t>
             </a:fld>
             <a:endParaRPr kumimoji="1" lang="zh-CN" altLang="en-US">
               <a:solidFill>
@@ -5029,7 +5029,7 @@
                   </a:prstClr>
                 </a:solidFill>
               </a:rPr>
-              <a:t>May 23, 2022</a:t>
+              <a:t>March 1, 2023</a:t>
             </a:fld>
             <a:endParaRPr lang="zh-CN" altLang="en-US">
               <a:solidFill>
@@ -5248,7 +5248,7 @@
                   </a:prstClr>
                 </a:solidFill>
               </a:rPr>
-              <a:t>May 23, 2022</a:t>
+              <a:t>March 1, 2023</a:t>
             </a:fld>
             <a:endParaRPr lang="zh-CN" altLang="en-US">
               <a:solidFill>
@@ -5477,7 +5477,7 @@
                   </a:prstClr>
                 </a:solidFill>
               </a:rPr>
-              <a:t>May 23, 2022</a:t>
+              <a:t>March 1, 2023</a:t>
             </a:fld>
             <a:endParaRPr lang="zh-CN" altLang="en-US">
               <a:solidFill>
@@ -5781,7 +5781,7 @@
                   </a:prstClr>
                 </a:solidFill>
               </a:rPr>
-              <a:t>May 23, 2022</a:t>
+              <a:t>March 1, 2023</a:t>
             </a:fld>
             <a:endParaRPr lang="zh-CN" altLang="en-US">
               <a:solidFill>
@@ -6246,7 +6246,7 @@
                   </a:prstClr>
                 </a:solidFill>
               </a:rPr>
-              <a:t>May 23, 2022</a:t>
+              <a:t>March 1, 2023</a:t>
             </a:fld>
             <a:endParaRPr lang="zh-CN" altLang="en-US">
               <a:solidFill>
@@ -6631,7 +6631,7 @@
                   </a:prstClr>
                 </a:solidFill>
               </a:rPr>
-              <a:t>May 23, 2022</a:t>
+              <a:t>March 1, 2023</a:t>
             </a:fld>
             <a:endParaRPr lang="zh-CN" altLang="en-US">
               <a:solidFill>
@@ -7059,7 +7059,7 @@
                   </a:prstClr>
                 </a:solidFill>
               </a:rPr>
-              <a:t>May 23, 2022</a:t>
+              <a:t>March 1, 2023</a:t>
             </a:fld>
             <a:endParaRPr lang="zh-CN" altLang="en-US">
               <a:solidFill>
@@ -7417,7 +7417,7 @@
                   </a:prstClr>
                 </a:solidFill>
               </a:rPr>
-              <a:t>May 23, 2022</a:t>
+              <a:t>March 1, 2023</a:t>
             </a:fld>
             <a:endParaRPr lang="zh-CN" altLang="en-US">
               <a:solidFill>
@@ -7704,7 +7704,7 @@
                   </a:prstClr>
                 </a:solidFill>
               </a:rPr>
-              <a:t>May 23, 2022</a:t>
+              <a:t>March 1, 2023</a:t>
             </a:fld>
             <a:endParaRPr lang="zh-CN" altLang="en-US">
               <a:solidFill>
@@ -7854,7 +7854,7 @@
                   </a:prstClr>
                 </a:solidFill>
               </a:rPr>
-              <a:t>May 23, 2022</a:t>
+              <a:t>March 1, 2023</a:t>
             </a:fld>
             <a:endParaRPr lang="zh-CN" altLang="en-US">
               <a:solidFill>
@@ -8097,7 +8097,7 @@
                 </a:solidFill>
                 <a:ea typeface="宋体"/>
               </a:rPr>
-              <a:t>May 23, 2022</a:t>
+              <a:t>March 1, 2023</a:t>
             </a:fld>
             <a:endParaRPr kumimoji="1" lang="zh-CN" altLang="en-US">
               <a:solidFill>
@@ -8437,7 +8437,7 @@
                   </a:prstClr>
                 </a:solidFill>
               </a:rPr>
-              <a:t>May 23, 2022</a:t>
+              <a:t>March 1, 2023</a:t>
             </a:fld>
             <a:endParaRPr lang="zh-CN" altLang="en-US">
               <a:solidFill>
@@ -8756,7 +8756,7 @@
                   </a:prstClr>
                 </a:solidFill>
               </a:rPr>
-              <a:t>May 23, 2022</a:t>
+              <a:t>March 1, 2023</a:t>
             </a:fld>
             <a:endParaRPr lang="zh-CN" altLang="en-US">
               <a:solidFill>
@@ -8975,7 +8975,7 @@
                   </a:prstClr>
                 </a:solidFill>
               </a:rPr>
-              <a:t>May 23, 2022</a:t>
+              <a:t>March 1, 2023</a:t>
             </a:fld>
             <a:endParaRPr lang="zh-CN" altLang="en-US">
               <a:solidFill>
@@ -9204,7 +9204,7 @@
                   </a:prstClr>
                 </a:solidFill>
               </a:rPr>
-              <a:t>May 23, 2022</a:t>
+              <a:t>March 1, 2023</a:t>
             </a:fld>
             <a:endParaRPr lang="zh-CN" altLang="en-US">
               <a:solidFill>
@@ -9533,7 +9533,7 @@
           <a:p>
             <a:fld id="{25D677E9-E279-4680-B081-AE76912FE034}" type="datetime4">
               <a:rPr lang="en-US" altLang="zh-CN" smtClean="0"/>
-              <a:t>May 23, 2022</a:t>
+              <a:t>March 1, 2023</a:t>
             </a:fld>
             <a:endParaRPr lang="zh-CN" altLang="en-US"/>
           </a:p>
@@ -9978,7 +9978,7 @@
                 </a:solidFill>
                 <a:ea typeface="宋体"/>
               </a:rPr>
-              <a:t>May 23, 2022</a:t>
+              <a:t>March 1, 2023</a:t>
             </a:fld>
             <a:endParaRPr kumimoji="1" lang="zh-CN" altLang="en-US">
               <a:solidFill>
@@ -10149,7 +10149,7 @@
                 </a:solidFill>
                 <a:ea typeface="宋体"/>
               </a:rPr>
-              <a:t>May 23, 2022</a:t>
+              <a:t>March 1, 2023</a:t>
             </a:fld>
             <a:endParaRPr kumimoji="1" lang="zh-CN" altLang="en-US">
               <a:solidFill>
@@ -10298,7 +10298,7 @@
                 </a:solidFill>
                 <a:ea typeface="宋体"/>
               </a:rPr>
-              <a:t>May 23, 2022</a:t>
+              <a:t>March 1, 2023</a:t>
             </a:fld>
             <a:endParaRPr kumimoji="1" lang="zh-CN" altLang="en-US">
               <a:solidFill>
@@ -10627,7 +10627,7 @@
                 </a:solidFill>
                 <a:ea typeface="宋体"/>
               </a:rPr>
-              <a:t>May 23, 2022</a:t>
+              <a:t>March 1, 2023</a:t>
             </a:fld>
             <a:endParaRPr kumimoji="1" lang="zh-CN" altLang="en-US">
               <a:solidFill>
@@ -10935,7 +10935,7 @@
                 </a:solidFill>
                 <a:ea typeface="宋体"/>
               </a:rPr>
-              <a:t>May 23, 2022</a:t>
+              <a:t>March 1, 2023</a:t>
             </a:fld>
             <a:endParaRPr kumimoji="1" lang="zh-CN" altLang="en-US">
               <a:solidFill>
@@ -11222,7 +11222,7 @@
                   </a:prstClr>
                 </a:solidFill>
               </a:rPr>
-              <a:t>May 23, 2022</a:t>
+              <a:t>March 1, 2023</a:t>
             </a:fld>
             <a:endParaRPr kumimoji="1" lang="zh-CN" altLang="en-US">
               <a:solidFill>
@@ -12002,7 +12002,7 @@
                   </a:prstClr>
                 </a:solidFill>
               </a:rPr>
-              <a:t>May 23, 2022</a:t>
+              <a:t>March 1, 2023</a:t>
             </a:fld>
             <a:endParaRPr lang="zh-CN" altLang="en-US">
               <a:solidFill>
@@ -12616,7 +12616,7 @@
                   </a:prstClr>
                 </a:solidFill>
               </a:rPr>
-              <a:t>May 23, 2022</a:t>
+              <a:t>March 1, 2023</a:t>
             </a:fld>
             <a:endParaRPr lang="zh-CN" altLang="en-US">
               <a:solidFill>
@@ -13829,13 +13829,13 @@
   <p:clrMapOvr>
     <a:masterClrMapping/>
   </p:clrMapOvr>
-  <mc:AlternateContent xmlns:mc="http://schemas.openxmlformats.org/markup-compatibility/2006">
-    <mc:Choice xmlns:p14="http://schemas.microsoft.com/office/powerpoint/2010/main" Requires="p14">
+  <mc:AlternateContent xmlns:mc="http://schemas.openxmlformats.org/markup-compatibility/2006" xmlns:p14="http://schemas.microsoft.com/office/powerpoint/2010/main">
+    <mc:Choice Requires="p14">
       <p:transition spd="med" p14:dur="700" advTm="9691">
         <p:fade/>
       </p:transition>
     </mc:Choice>
-    <mc:Fallback>
+    <mc:Fallback xmlns="">
       <p:transition spd="med" advTm="9691">
         <p:fade/>
       </p:transition>
@@ -13933,7 +13933,7 @@
                 </a:solidFill>
                 <a:ea typeface="宋体"/>
               </a:rPr>
-              <a:t>May 23, 2022</a:t>
+              <a:t>March 1, 2023</a:t>
             </a:fld>
             <a:endParaRPr kumimoji="1" lang="zh-CN" altLang="en-US">
               <a:solidFill>
@@ -14407,7 +14407,7 @@
                 </a:solidFill>
                 <a:ea typeface="宋体"/>
               </a:rPr>
-              <a:t>May 23, 2022</a:t>
+              <a:t>March 1, 2023</a:t>
             </a:fld>
             <a:endParaRPr kumimoji="1" lang="zh-CN" altLang="en-US">
               <a:solidFill>
@@ -15405,7 +15405,7 @@
                 </a:solidFill>
                 <a:ea typeface="宋体"/>
               </a:rPr>
-              <a:t>May 23, 2022</a:t>
+              <a:t>March 1, 2023</a:t>
             </a:fld>
             <a:endParaRPr kumimoji="1" lang="zh-CN" altLang="en-US">
               <a:solidFill>
@@ -15996,7 +15996,7 @@
                 </a:solidFill>
                 <a:ea typeface="宋体"/>
               </a:rPr>
-              <a:t>May 23, 2022</a:t>
+              <a:t>March 1, 2023</a:t>
             </a:fld>
             <a:endParaRPr kumimoji="1" lang="zh-CN" altLang="en-US">
               <a:solidFill>
@@ -16533,7 +16533,7 @@
                 </a:solidFill>
                 <a:ea typeface="宋体"/>
               </a:rPr>
-              <a:t>May 23, 2022</a:t>
+              <a:t>March 1, 2023</a:t>
             </a:fld>
             <a:endParaRPr kumimoji="1" lang="zh-CN" altLang="en-US">
               <a:solidFill>
@@ -16911,7 +16911,7 @@
                 </a:solidFill>
                 <a:ea typeface="宋体"/>
               </a:rPr>
-              <a:t>May 23, 2022</a:t>
+              <a:t>March 1, 2023</a:t>
             </a:fld>
             <a:endParaRPr kumimoji="1" lang="zh-CN" altLang="en-US">
               <a:solidFill>
@@ -17509,7 +17509,7 @@
                 </a:solidFill>
                 <a:ea typeface="宋体"/>
               </a:rPr>
-              <a:t>May 23, 2022</a:t>
+              <a:t>March 1, 2023</a:t>
             </a:fld>
             <a:endParaRPr kumimoji="1" lang="zh-CN" altLang="en-US">
               <a:solidFill>
@@ -17761,6 +17761,57 @@
               <a:t>Only one test producing any given hash is emitted</a:t>
             </a:r>
             <a:endParaRPr lang="zh-CN" altLang="en-US" sz="2400" dirty="0"/>
+          </a:p>
+        </p:txBody>
+      </p:sp>
+      <p:sp>
+        <p:nvSpPr>
+          <p:cNvPr id="3" name="文本框 2">
+            <a:extLst>
+              <a:ext uri="{FF2B5EF4-FFF2-40B4-BE49-F238E27FC236}">
+                <a16:creationId xmlns:a16="http://schemas.microsoft.com/office/drawing/2014/main" id="{5EFBE4CE-0422-0F2D-49C4-FE5D743A55AF}"/>
+              </a:ext>
+            </a:extLst>
+          </p:cNvPr>
+          <p:cNvSpPr txBox="1"/>
+          <p:nvPr/>
+        </p:nvSpPr>
+        <p:spPr>
+          <a:xfrm>
+            <a:off x="383906" y="5646359"/>
+            <a:ext cx="8511593" cy="646331"/>
+          </a:xfrm>
+          <a:prstGeom prst="rect">
+            <a:avLst/>
+          </a:prstGeom>
+          <a:noFill/>
+        </p:spPr>
+        <p:txBody>
+          <a:bodyPr wrap="square" rtlCol="0">
+            <a:spAutoFit/>
+          </a:bodyPr>
+          <a:lstStyle/>
+          <a:p>
+            <a:pPr algn="l"/>
+            <a:r>
+              <a:rPr lang="en-US" altLang="zh-CN" sz="1800" b="0" i="0" u="none" strike="noStrike" baseline="0" dirty="0">
+                <a:latin typeface="NimbusRomNo9L-Medi"/>
+              </a:rPr>
+              <a:t>ASPLOS’2017 Automated Synthesis of Comprehensive Memory Model Litmus Test Suites (</a:t>
+            </a:r>
+            <a:r>
+              <a:rPr lang="en-US" altLang="zh-CN" dirty="0">
+                <a:solidFill>
+                  <a:srgbClr val="0070C0"/>
+                </a:solidFill>
+              </a:rPr>
+              <a:t>https://github.com/nvlabs/litmustestgen</a:t>
+            </a:r>
+            <a:r>
+              <a:rPr lang="en-US" altLang="zh-CN" dirty="0"/>
+              <a:t>)</a:t>
+            </a:r>
+            <a:endParaRPr lang="zh-CN" altLang="en-US" dirty="0"/>
           </a:p>
         </p:txBody>
       </p:sp>
@@ -17932,7 +17983,7 @@
                 </a:solidFill>
                 <a:ea typeface="宋体"/>
               </a:rPr>
-              <a:t>May 23, 2022</a:t>
+              <a:t>March 1, 2023</a:t>
             </a:fld>
             <a:endParaRPr kumimoji="1" lang="zh-CN" altLang="en-US">
               <a:solidFill>
@@ -18596,7 +18647,7 @@
                   </a:prstClr>
                 </a:solidFill>
               </a:rPr>
-              <a:t>May 23, 2022</a:t>
+              <a:t>March 1, 2023</a:t>
             </a:fld>
             <a:endParaRPr lang="zh-CN" altLang="en-US">
               <a:solidFill>
@@ -18725,7 +18776,7 @@
                 </a:solidFill>
                 <a:ea typeface="宋体"/>
               </a:rPr>
-              <a:t>May 23, 2022</a:t>
+              <a:t>March 1, 2023</a:t>
             </a:fld>
             <a:endParaRPr kumimoji="1" lang="zh-CN" altLang="en-US">
               <a:solidFill>
@@ -20065,7 +20116,7 @@
                 </a:solidFill>
                 <a:ea typeface="宋体"/>
               </a:rPr>
-              <a:t>May 23, 2022</a:t>
+              <a:t>March 1, 2023</a:t>
             </a:fld>
             <a:endParaRPr kumimoji="1" lang="zh-CN" altLang="en-US">
               <a:solidFill>
@@ -20367,7 +20418,7 @@
                 </a:solidFill>
                 <a:ea typeface="宋体"/>
               </a:rPr>
-              <a:t>May 23, 2022</a:t>
+              <a:t>March 1, 2023</a:t>
             </a:fld>
             <a:endParaRPr kumimoji="1" lang="zh-CN" altLang="en-US">
               <a:solidFill>
@@ -21806,7 +21857,7 @@
                 </a:solidFill>
                 <a:ea typeface="宋体"/>
               </a:rPr>
-              <a:t>May 23, 2022</a:t>
+              <a:t>March 1, 2023</a:t>
             </a:fld>
             <a:endParaRPr kumimoji="1" lang="zh-CN" altLang="en-US">
               <a:solidFill>
@@ -22337,7 +22388,7 @@
                 </a:solidFill>
                 <a:ea typeface="宋体"/>
               </a:rPr>
-              <a:t>May 23, 2022</a:t>
+              <a:t>March 1, 2023</a:t>
             </a:fld>
             <a:endParaRPr kumimoji="1" lang="zh-CN" altLang="en-US">
               <a:solidFill>
@@ -22930,7 +22981,7 @@
                 </a:solidFill>
                 <a:ea typeface="宋体"/>
               </a:rPr>
-              <a:t>May 23, 2022</a:t>
+              <a:t>March 1, 2023</a:t>
             </a:fld>
             <a:endParaRPr kumimoji="1" lang="zh-CN" altLang="en-US">
               <a:solidFill>
@@ -23565,7 +23616,7 @@
                 </a:solidFill>
                 <a:ea typeface="宋体"/>
               </a:rPr>
-              <a:t>May 23, 2022</a:t>
+              <a:t>March 1, 2023</a:t>
             </a:fld>
             <a:endParaRPr kumimoji="1" lang="zh-CN" altLang="en-US">
               <a:solidFill>
@@ -24180,7 +24231,7 @@
                 </a:solidFill>
                 <a:ea typeface="宋体"/>
               </a:rPr>
-              <a:t>May 23, 2022</a:t>
+              <a:t>March 1, 2023</a:t>
             </a:fld>
             <a:endParaRPr kumimoji="1" lang="zh-CN" altLang="en-US">
               <a:solidFill>

</xml_diff>